<commit_message>
mysql install instruction updated and slides
</commit_message>
<xml_diff>
--- a/Finished Deliverables/11-Presentation Slides/RIS Presentation Slides.pptx
+++ b/Finished Deliverables/11-Presentation Slides/RIS Presentation Slides.pptx
@@ -6871,18 +6871,87 @@
             </a:r>
           </a:p>
           <a:p>
-            <a:endParaRPr lang="en-US" dirty="0"/>
-          </a:p>
-          <a:p>
-            <a:endParaRPr lang="en-US" dirty="0"/>
-          </a:p>
-          <a:p>
+            <a:pPr marL="36900" indent="0">
+              <a:buNone/>
+            </a:pPr>
+            <a:r>
+              <a:rPr lang="en-US" dirty="0"/>
+              <a:t>	User Info feature owner</a:t>
+            </a:r>
+          </a:p>
+          <a:p>
+            <a:pPr marL="36900" indent="0">
+              <a:buNone/>
+            </a:pPr>
+            <a:r>
+              <a:rPr lang="en-US" dirty="0"/>
+              <a:t>	Modeling and Design</a:t>
+            </a:r>
+          </a:p>
+          <a:p>
+            <a:pPr marL="36900" indent="0">
+              <a:buNone/>
+            </a:pPr>
+            <a:r>
+              <a:rPr lang="en-US" dirty="0"/>
+              <a:t>	Stress Testing </a:t>
+            </a:r>
+          </a:p>
+          <a:p>
+            <a:pPr marL="36900" indent="0">
+              <a:buNone/>
+            </a:pPr>
+            <a:r>
+              <a:rPr lang="en-US" dirty="0"/>
+              <a:t>	Debugging</a:t>
+            </a:r>
+          </a:p>
+          <a:p>
+            <a:pPr marL="36900" indent="0">
+              <a:buNone/>
+            </a:pPr>
             <a:endParaRPr lang="en-US" dirty="0"/>
           </a:p>
           <a:p>
             <a:r>
               <a:rPr lang="en-US" dirty="0"/>
               <a:t>Cole Ledford</a:t>
+            </a:r>
+          </a:p>
+          <a:p>
+            <a:pPr marL="450000" lvl="1" indent="0">
+              <a:buNone/>
+            </a:pPr>
+            <a:r>
+              <a:rPr lang="en-US" dirty="0"/>
+              <a:t>Billing feature owner</a:t>
+            </a:r>
+          </a:p>
+          <a:p>
+            <a:pPr marL="450000" lvl="1" indent="0">
+              <a:buNone/>
+            </a:pPr>
+            <a:r>
+              <a:rPr lang="en-US" dirty="0"/>
+              <a:t>	Modeling and Design</a:t>
+            </a:r>
+          </a:p>
+          <a:p>
+            <a:pPr marL="450000" lvl="1" indent="0">
+              <a:buNone/>
+            </a:pPr>
+            <a:r>
+              <a:rPr lang="en-US" dirty="0"/>
+              <a:t>Stress testing </a:t>
+            </a:r>
+          </a:p>
+          <a:p>
+            <a:pPr marL="450000" lvl="1" indent="0">
+              <a:buNone/>
+            </a:pPr>
+            <a:r>
+              <a:rPr lang="en-US" dirty="0"/>
+              <a:t>Debugging</a:t>
             </a:r>
           </a:p>
         </p:txBody>

</xml_diff>